<commit_message>
TW edits after bar raiser review of landing page
</commit_message>
<xml_diff>
--- a/docs/deployment_guide/images/jfrog-artifactory-xray-eks-update-0222.pptx
+++ b/docs/deployment_guide/images/jfrog-artifactory-xray-eks-update-0222.pptx
@@ -5,7 +5,7 @@
     <p:sldMasterId id="2147483672" r:id="rId1"/>
   </p:sldMasterIdLst>
   <p:sldIdLst>
-    <p:sldId id="260" r:id="rId2"/>
+    <p:sldId id="261" r:id="rId2"/>
   </p:sldIdLst>
   <p:sldSz cx="18288000" cy="10972800"/>
   <p:notesSz cx="6858000" cy="9144000"/>
@@ -243,7 +243,7 @@
           <a:p>
             <a:fld id="{E4E2967C-8111-4A95-987E-5FB9A3B58069}" type="datetimeFigureOut">
               <a:rPr lang="en-US" smtClean="0"/>
-              <a:t>2/22/2022</a:t>
+              <a:t>3/4/2022</a:t>
             </a:fld>
             <a:endParaRPr lang="en-US"/>
           </a:p>
@@ -413,7 +413,7 @@
           <a:p>
             <a:fld id="{E4E2967C-8111-4A95-987E-5FB9A3B58069}" type="datetimeFigureOut">
               <a:rPr lang="en-US" smtClean="0"/>
-              <a:t>2/22/2022</a:t>
+              <a:t>3/4/2022</a:t>
             </a:fld>
             <a:endParaRPr lang="en-US"/>
           </a:p>
@@ -593,7 +593,7 @@
           <a:p>
             <a:fld id="{E4E2967C-8111-4A95-987E-5FB9A3B58069}" type="datetimeFigureOut">
               <a:rPr lang="en-US" smtClean="0"/>
-              <a:t>2/22/2022</a:t>
+              <a:t>3/4/2022</a:t>
             </a:fld>
             <a:endParaRPr lang="en-US"/>
           </a:p>
@@ -763,7 +763,7 @@
           <a:p>
             <a:fld id="{E4E2967C-8111-4A95-987E-5FB9A3B58069}" type="datetimeFigureOut">
               <a:rPr lang="en-US" smtClean="0"/>
-              <a:t>2/22/2022</a:t>
+              <a:t>3/4/2022</a:t>
             </a:fld>
             <a:endParaRPr lang="en-US"/>
           </a:p>
@@ -1009,7 +1009,7 @@
           <a:p>
             <a:fld id="{E4E2967C-8111-4A95-987E-5FB9A3B58069}" type="datetimeFigureOut">
               <a:rPr lang="en-US" smtClean="0"/>
-              <a:t>2/22/2022</a:t>
+              <a:t>3/4/2022</a:t>
             </a:fld>
             <a:endParaRPr lang="en-US"/>
           </a:p>
@@ -1241,7 +1241,7 @@
           <a:p>
             <a:fld id="{E4E2967C-8111-4A95-987E-5FB9A3B58069}" type="datetimeFigureOut">
               <a:rPr lang="en-US" smtClean="0"/>
-              <a:t>2/22/2022</a:t>
+              <a:t>3/4/2022</a:t>
             </a:fld>
             <a:endParaRPr lang="en-US"/>
           </a:p>
@@ -1608,7 +1608,7 @@
           <a:p>
             <a:fld id="{E4E2967C-8111-4A95-987E-5FB9A3B58069}" type="datetimeFigureOut">
               <a:rPr lang="en-US" smtClean="0"/>
-              <a:t>2/22/2022</a:t>
+              <a:t>3/4/2022</a:t>
             </a:fld>
             <a:endParaRPr lang="en-US"/>
           </a:p>
@@ -1726,7 +1726,7 @@
           <a:p>
             <a:fld id="{E4E2967C-8111-4A95-987E-5FB9A3B58069}" type="datetimeFigureOut">
               <a:rPr lang="en-US" smtClean="0"/>
-              <a:t>2/22/2022</a:t>
+              <a:t>3/4/2022</a:t>
             </a:fld>
             <a:endParaRPr lang="en-US"/>
           </a:p>
@@ -1821,7 +1821,7 @@
           <a:p>
             <a:fld id="{E4E2967C-8111-4A95-987E-5FB9A3B58069}" type="datetimeFigureOut">
               <a:rPr lang="en-US" smtClean="0"/>
-              <a:t>2/22/2022</a:t>
+              <a:t>3/4/2022</a:t>
             </a:fld>
             <a:endParaRPr lang="en-US"/>
           </a:p>
@@ -2098,7 +2098,7 @@
           <a:p>
             <a:fld id="{E4E2967C-8111-4A95-987E-5FB9A3B58069}" type="datetimeFigureOut">
               <a:rPr lang="en-US" smtClean="0"/>
-              <a:t>2/22/2022</a:t>
+              <a:t>3/4/2022</a:t>
             </a:fld>
             <a:endParaRPr lang="en-US"/>
           </a:p>
@@ -2355,7 +2355,7 @@
           <a:p>
             <a:fld id="{E4E2967C-8111-4A95-987E-5FB9A3B58069}" type="datetimeFigureOut">
               <a:rPr lang="en-US" smtClean="0"/>
-              <a:t>2/22/2022</a:t>
+              <a:t>3/4/2022</a:t>
             </a:fld>
             <a:endParaRPr lang="en-US"/>
           </a:p>
@@ -2568,7 +2568,7 @@
           <a:p>
             <a:fld id="{E4E2967C-8111-4A95-987E-5FB9A3B58069}" type="datetimeFigureOut">
               <a:rPr lang="en-US" smtClean="0"/>
-              <a:t>2/22/2022</a:t>
+              <a:t>3/4/2022</a:t>
             </a:fld>
             <a:endParaRPr lang="en-US"/>
           </a:p>
@@ -5519,227 +5519,6 @@
           </a:extLst>
         </p:spPr>
       </p:pic>
-      <p:pic>
-        <p:nvPicPr>
-          <p:cNvPr id="64" name="Graphic 6">
-            <a:extLst>
-              <a:ext uri="{FF2B5EF4-FFF2-40B4-BE49-F238E27FC236}">
-                <a16:creationId xmlns:a16="http://schemas.microsoft.com/office/drawing/2014/main" id="{21D1DC05-79D0-4AB5-A24C-0BDE3C82B7BA}"/>
-              </a:ext>
-            </a:extLst>
-          </p:cNvPr>
-          <p:cNvPicPr>
-            <a:picLocks noChangeAspect="1" noChangeArrowheads="1"/>
-          </p:cNvPicPr>
-          <p:nvPr/>
-        </p:nvPicPr>
-        <p:blipFill>
-          <a:blip r:embed="rId16">
-            <a:extLst>
-              <a:ext uri="{28A0092B-C50C-407E-A947-70E740481C1C}">
-                <a14:useLocalDpi xmlns:a14="http://schemas.microsoft.com/office/drawing/2010/main" val="0"/>
-              </a:ext>
-            </a:extLst>
-          </a:blip>
-          <a:srcRect/>
-          <a:stretch>
-            <a:fillRect/>
-          </a:stretch>
-        </p:blipFill>
-        <p:spPr bwMode="auto">
-          <a:xfrm>
-            <a:off x="8277812" y="6909154"/>
-            <a:ext cx="685800" cy="685800"/>
-          </a:xfrm>
-          <a:prstGeom prst="rect">
-            <a:avLst/>
-          </a:prstGeom>
-          <a:noFill/>
-          <a:ln>
-            <a:noFill/>
-          </a:ln>
-          <a:extLst>
-            <a:ext uri="{909E8E84-426E-40DD-AFC4-6F175D3DCCD1}">
-              <a14:hiddenFill xmlns:a14="http://schemas.microsoft.com/office/drawing/2010/main">
-                <a:solidFill>
-                  <a:srgbClr val="FFFFFF"/>
-                </a:solidFill>
-              </a14:hiddenFill>
-            </a:ext>
-            <a:ext uri="{91240B29-F687-4F45-9708-019B960494DF}">
-              <a14:hiddenLine xmlns:a14="http://schemas.microsoft.com/office/drawing/2010/main" w="9525">
-                <a:solidFill>
-                  <a:srgbClr val="000000"/>
-                </a:solidFill>
-                <a:miter lim="800000"/>
-                <a:headEnd/>
-                <a:tailEnd/>
-              </a14:hiddenLine>
-            </a:ext>
-          </a:extLst>
-        </p:spPr>
-      </p:pic>
-      <p:sp>
-        <p:nvSpPr>
-          <p:cNvPr id="65" name="TextBox 9">
-            <a:extLst>
-              <a:ext uri="{FF2B5EF4-FFF2-40B4-BE49-F238E27FC236}">
-                <a16:creationId xmlns:a16="http://schemas.microsoft.com/office/drawing/2014/main" id="{BA520B30-626F-4603-BF8D-4E857CB44DAD}"/>
-              </a:ext>
-            </a:extLst>
-          </p:cNvPr>
-          <p:cNvSpPr txBox="1">
-            <a:spLocks noChangeArrowheads="1"/>
-          </p:cNvSpPr>
-          <p:nvPr/>
-        </p:nvSpPr>
-        <p:spPr bwMode="auto">
-          <a:xfrm>
-            <a:off x="7499144" y="7573655"/>
-            <a:ext cx="2243137" cy="276999"/>
-          </a:xfrm>
-          <a:prstGeom prst="rect">
-            <a:avLst/>
-          </a:prstGeom>
-          <a:noFill/>
-          <a:ln>
-            <a:noFill/>
-          </a:ln>
-          <a:extLst>
-            <a:ext uri="{909E8E84-426E-40DD-AFC4-6F175D3DCCD1}">
-              <a14:hiddenFill xmlns:a14="http://schemas.microsoft.com/office/drawing/2010/main">
-                <a:solidFill>
-                  <a:srgbClr val="FFFFFF"/>
-                </a:solidFill>
-              </a14:hiddenFill>
-            </a:ext>
-            <a:ext uri="{91240B29-F687-4F45-9708-019B960494DF}">
-              <a14:hiddenLine xmlns:a14="http://schemas.microsoft.com/office/drawing/2010/main" w="9525">
-                <a:solidFill>
-                  <a:srgbClr val="000000"/>
-                </a:solidFill>
-                <a:miter lim="800000"/>
-                <a:headEnd/>
-                <a:tailEnd/>
-              </a14:hiddenLine>
-            </a:ext>
-          </a:extLst>
-        </p:spPr>
-        <p:txBody>
-          <a:bodyPr>
-            <a:spAutoFit/>
-          </a:bodyPr>
-          <a:lstStyle>
-            <a:lvl1pPr>
-              <a:defRPr>
-                <a:solidFill>
-                  <a:schemeClr val="tx1"/>
-                </a:solidFill>
-                <a:latin typeface="Calibri" panose="020F0502020204030204" pitchFamily="34" charset="0"/>
-              </a:defRPr>
-            </a:lvl1pPr>
-            <a:lvl2pPr marL="742950" indent="-285750">
-              <a:defRPr>
-                <a:solidFill>
-                  <a:schemeClr val="tx1"/>
-                </a:solidFill>
-                <a:latin typeface="Calibri" panose="020F0502020204030204" pitchFamily="34" charset="0"/>
-              </a:defRPr>
-            </a:lvl2pPr>
-            <a:lvl3pPr marL="1143000" indent="-228600">
-              <a:defRPr>
-                <a:solidFill>
-                  <a:schemeClr val="tx1"/>
-                </a:solidFill>
-                <a:latin typeface="Calibri" panose="020F0502020204030204" pitchFamily="34" charset="0"/>
-              </a:defRPr>
-            </a:lvl3pPr>
-            <a:lvl4pPr marL="1600200" indent="-228600">
-              <a:defRPr>
-                <a:solidFill>
-                  <a:schemeClr val="tx1"/>
-                </a:solidFill>
-                <a:latin typeface="Calibri" panose="020F0502020204030204" pitchFamily="34" charset="0"/>
-              </a:defRPr>
-            </a:lvl4pPr>
-            <a:lvl5pPr marL="2057400" indent="-228600">
-              <a:defRPr>
-                <a:solidFill>
-                  <a:schemeClr val="tx1"/>
-                </a:solidFill>
-                <a:latin typeface="Calibri" panose="020F0502020204030204" pitchFamily="34" charset="0"/>
-              </a:defRPr>
-            </a:lvl5pPr>
-            <a:lvl6pPr marL="2514600" indent="-228600" eaLnBrk="0" fontAlgn="base" hangingPunct="0">
-              <a:spcBef>
-                <a:spcPct val="0"/>
-              </a:spcBef>
-              <a:spcAft>
-                <a:spcPct val="0"/>
-              </a:spcAft>
-              <a:defRPr>
-                <a:solidFill>
-                  <a:schemeClr val="tx1"/>
-                </a:solidFill>
-                <a:latin typeface="Calibri" panose="020F0502020204030204" pitchFamily="34" charset="0"/>
-              </a:defRPr>
-            </a:lvl6pPr>
-            <a:lvl7pPr marL="2971800" indent="-228600" eaLnBrk="0" fontAlgn="base" hangingPunct="0">
-              <a:spcBef>
-                <a:spcPct val="0"/>
-              </a:spcBef>
-              <a:spcAft>
-                <a:spcPct val="0"/>
-              </a:spcAft>
-              <a:defRPr>
-                <a:solidFill>
-                  <a:schemeClr val="tx1"/>
-                </a:solidFill>
-                <a:latin typeface="Calibri" panose="020F0502020204030204" pitchFamily="34" charset="0"/>
-              </a:defRPr>
-            </a:lvl7pPr>
-            <a:lvl8pPr marL="3429000" indent="-228600" eaLnBrk="0" fontAlgn="base" hangingPunct="0">
-              <a:spcBef>
-                <a:spcPct val="0"/>
-              </a:spcBef>
-              <a:spcAft>
-                <a:spcPct val="0"/>
-              </a:spcAft>
-              <a:defRPr>
-                <a:solidFill>
-                  <a:schemeClr val="tx1"/>
-                </a:solidFill>
-                <a:latin typeface="Calibri" panose="020F0502020204030204" pitchFamily="34" charset="0"/>
-              </a:defRPr>
-            </a:lvl8pPr>
-            <a:lvl9pPr marL="3886200" indent="-228600" eaLnBrk="0" fontAlgn="base" hangingPunct="0">
-              <a:spcBef>
-                <a:spcPct val="0"/>
-              </a:spcBef>
-              <a:spcAft>
-                <a:spcPct val="0"/>
-              </a:spcAft>
-              <a:defRPr>
-                <a:solidFill>
-                  <a:schemeClr val="tx1"/>
-                </a:solidFill>
-                <a:latin typeface="Calibri" panose="020F0502020204030204" pitchFamily="34" charset="0"/>
-              </a:defRPr>
-            </a:lvl9pPr>
-          </a:lstStyle>
-          <a:p>
-            <a:pPr algn="ctr" eaLnBrk="1" hangingPunct="1"/>
-            <a:r>
-              <a:rPr lang="en-US" altLang="en-US" sz="1200" dirty="0">
-                <a:latin typeface="Arial" panose="020B0604020202020204" pitchFamily="34" charset="0"/>
-                <a:ea typeface="Amazon Ember" panose="020B0603020204020204" pitchFamily="34" charset="0"/>
-                <a:cs typeface="Arial" panose="020B0604020202020204" pitchFamily="34" charset="0"/>
-              </a:rPr>
-              <a:t>Amazon RDS</a:t>
-            </a:r>
-          </a:p>
-        </p:txBody>
-      </p:sp>
       <p:sp>
         <p:nvSpPr>
           <p:cNvPr id="76" name="TextBox 25">
@@ -6817,10 +6596,10 @@
           <p:nvPr/>
         </p:nvPicPr>
         <p:blipFill>
-          <a:blip r:embed="rId17">
+          <a:blip r:embed="rId16">
             <a:extLst>
               <a:ext uri="{96DAC541-7B7A-43D3-8B79-37D633B846F1}">
-                <asvg:svgBlip xmlns:asvg="http://schemas.microsoft.com/office/drawing/2016/SVG/main" r:embed="rId18"/>
+                <asvg:svgBlip xmlns:asvg="http://schemas.microsoft.com/office/drawing/2016/SVG/main" r:embed="rId17"/>
               </a:ext>
             </a:extLst>
           </a:blip>
@@ -6853,10 +6632,10 @@
           <p:nvPr/>
         </p:nvPicPr>
         <p:blipFill>
-          <a:blip r:embed="rId19">
+          <a:blip r:embed="rId18">
             <a:extLst>
               <a:ext uri="{96DAC541-7B7A-43D3-8B79-37D633B846F1}">
-                <asvg:svgBlip xmlns:asvg="http://schemas.microsoft.com/office/drawing/2016/SVG/main" r:embed="rId20"/>
+                <asvg:svgBlip xmlns:asvg="http://schemas.microsoft.com/office/drawing/2016/SVG/main" r:embed="rId19"/>
               </a:ext>
             </a:extLst>
           </a:blip>
@@ -6889,7 +6668,7 @@
           <p:nvPr/>
         </p:nvPicPr>
         <p:blipFill>
-          <a:blip r:embed="rId21">
+          <a:blip r:embed="rId20">
             <a:extLst>
               <a:ext uri="{28A0092B-C50C-407E-A947-70E740481C1C}">
                 <a14:useLocalDpi xmlns:a14="http://schemas.microsoft.com/office/drawing/2010/main" val="0"/>
@@ -7110,10 +6889,10 @@
           <p:nvPr/>
         </p:nvPicPr>
         <p:blipFill>
-          <a:blip r:embed="rId22">
+          <a:blip r:embed="rId21">
             <a:extLst>
               <a:ext uri="{96DAC541-7B7A-43D3-8B79-37D633B846F1}">
-                <asvg:svgBlip xmlns:asvg="http://schemas.microsoft.com/office/drawing/2016/SVG/main" r:embed="rId23"/>
+                <asvg:svgBlip xmlns:asvg="http://schemas.microsoft.com/office/drawing/2016/SVG/main" r:embed="rId22"/>
               </a:ext>
             </a:extLst>
           </a:blip>
@@ -7168,10 +6947,10 @@
           <p:nvPr/>
         </p:nvPicPr>
         <p:blipFill>
-          <a:blip r:embed="rId24">
+          <a:blip r:embed="rId23">
             <a:extLst>
               <a:ext uri="{96DAC541-7B7A-43D3-8B79-37D633B846F1}">
-                <asvg:svgBlip xmlns:asvg="http://schemas.microsoft.com/office/drawing/2016/SVG/main" r:embed="rId25"/>
+                <asvg:svgBlip xmlns:asvg="http://schemas.microsoft.com/office/drawing/2016/SVG/main" r:embed="rId24"/>
               </a:ext>
             </a:extLst>
           </a:blip>
@@ -7939,7 +7718,7 @@
           <p:nvPr/>
         </p:nvPicPr>
         <p:blipFill>
-          <a:blip r:embed="rId26">
+          <a:blip r:embed="rId25">
             <a:extLst>
               <a:ext uri="{28A0092B-C50C-407E-A947-70E740481C1C}">
                 <a14:useLocalDpi xmlns:a14="http://schemas.microsoft.com/office/drawing/2010/main" val="0"/>
@@ -8160,7 +7939,7 @@
           <p:nvPr/>
         </p:nvPicPr>
         <p:blipFill>
-          <a:blip r:embed="rId27">
+          <a:blip r:embed="rId26">
             <a:extLst>
               <a:ext uri="{28A0092B-C50C-407E-A947-70E740481C1C}">
                 <a14:useLocalDpi xmlns:a14="http://schemas.microsoft.com/office/drawing/2010/main" val="0"/>
@@ -9671,236 +9450,6 @@
           </a:extLst>
         </p:spPr>
       </p:pic>
-      <p:pic>
-        <p:nvPicPr>
-          <p:cNvPr id="154" name="Graphic 6">
-            <a:extLst>
-              <a:ext uri="{FF2B5EF4-FFF2-40B4-BE49-F238E27FC236}">
-                <a16:creationId xmlns:a16="http://schemas.microsoft.com/office/drawing/2014/main" id="{FEB4973E-E160-43DE-BD65-A4BA533C259B}"/>
-              </a:ext>
-            </a:extLst>
-          </p:cNvPr>
-          <p:cNvPicPr>
-            <a:picLocks noChangeAspect="1" noChangeArrowheads="1"/>
-          </p:cNvPicPr>
-          <p:nvPr/>
-        </p:nvPicPr>
-        <p:blipFill>
-          <a:blip r:embed="rId28">
-            <a:extLst>
-              <a:ext uri="{BEBA8EAE-BF5A-486C-A8C5-ECC9F3942E4B}">
-                <a14:imgProps xmlns:a14="http://schemas.microsoft.com/office/drawing/2010/main">
-                  <a14:imgLayer r:embed="rId29">
-                    <a14:imgEffect>
-                      <a14:artisticBlur/>
-                    </a14:imgEffect>
-                  </a14:imgLayer>
-                </a14:imgProps>
-              </a:ext>
-              <a:ext uri="{28A0092B-C50C-407E-A947-70E740481C1C}">
-                <a14:useLocalDpi xmlns:a14="http://schemas.microsoft.com/office/drawing/2010/main" val="0"/>
-              </a:ext>
-            </a:extLst>
-          </a:blip>
-          <a:srcRect/>
-          <a:stretch>
-            <a:fillRect/>
-          </a:stretch>
-        </p:blipFill>
-        <p:spPr bwMode="auto">
-          <a:xfrm>
-            <a:off x="11659049" y="6909154"/>
-            <a:ext cx="685800" cy="685800"/>
-          </a:xfrm>
-          <a:prstGeom prst="rect">
-            <a:avLst/>
-          </a:prstGeom>
-          <a:noFill/>
-          <a:ln>
-            <a:noFill/>
-          </a:ln>
-          <a:extLst>
-            <a:ext uri="{909E8E84-426E-40DD-AFC4-6F175D3DCCD1}">
-              <a14:hiddenFill xmlns:a14="http://schemas.microsoft.com/office/drawing/2010/main">
-                <a:solidFill>
-                  <a:srgbClr val="FFFFFF"/>
-                </a:solidFill>
-              </a14:hiddenFill>
-            </a:ext>
-            <a:ext uri="{91240B29-F687-4F45-9708-019B960494DF}">
-              <a14:hiddenLine xmlns:a14="http://schemas.microsoft.com/office/drawing/2010/main" w="9525">
-                <a:solidFill>
-                  <a:srgbClr val="000000"/>
-                </a:solidFill>
-                <a:miter lim="800000"/>
-                <a:headEnd/>
-                <a:tailEnd/>
-              </a14:hiddenLine>
-            </a:ext>
-          </a:extLst>
-        </p:spPr>
-      </p:pic>
-      <p:sp>
-        <p:nvSpPr>
-          <p:cNvPr id="155" name="TextBox 9">
-            <a:extLst>
-              <a:ext uri="{FF2B5EF4-FFF2-40B4-BE49-F238E27FC236}">
-                <a16:creationId xmlns:a16="http://schemas.microsoft.com/office/drawing/2014/main" id="{DBB9FC78-AEE0-417D-8210-DBD9334E2222}"/>
-              </a:ext>
-            </a:extLst>
-          </p:cNvPr>
-          <p:cNvSpPr txBox="1">
-            <a:spLocks noChangeArrowheads="1"/>
-          </p:cNvSpPr>
-          <p:nvPr/>
-        </p:nvSpPr>
-        <p:spPr bwMode="auto">
-          <a:xfrm>
-            <a:off x="10880381" y="7573655"/>
-            <a:ext cx="2243137" cy="276999"/>
-          </a:xfrm>
-          <a:prstGeom prst="rect">
-            <a:avLst/>
-          </a:prstGeom>
-          <a:noFill/>
-          <a:ln>
-            <a:noFill/>
-          </a:ln>
-          <a:extLst>
-            <a:ext uri="{909E8E84-426E-40DD-AFC4-6F175D3DCCD1}">
-              <a14:hiddenFill xmlns:a14="http://schemas.microsoft.com/office/drawing/2010/main">
-                <a:solidFill>
-                  <a:srgbClr val="FFFFFF"/>
-                </a:solidFill>
-              </a14:hiddenFill>
-            </a:ext>
-            <a:ext uri="{91240B29-F687-4F45-9708-019B960494DF}">
-              <a14:hiddenLine xmlns:a14="http://schemas.microsoft.com/office/drawing/2010/main" w="9525">
-                <a:solidFill>
-                  <a:srgbClr val="000000"/>
-                </a:solidFill>
-                <a:miter lim="800000"/>
-                <a:headEnd/>
-                <a:tailEnd/>
-              </a14:hiddenLine>
-            </a:ext>
-          </a:extLst>
-        </p:spPr>
-        <p:txBody>
-          <a:bodyPr>
-            <a:spAutoFit/>
-          </a:bodyPr>
-          <a:lstStyle>
-            <a:lvl1pPr>
-              <a:defRPr>
-                <a:solidFill>
-                  <a:schemeClr val="tx1"/>
-                </a:solidFill>
-                <a:latin typeface="Calibri" panose="020F0502020204030204" pitchFamily="34" charset="0"/>
-              </a:defRPr>
-            </a:lvl1pPr>
-            <a:lvl2pPr marL="742950" indent="-285750">
-              <a:defRPr>
-                <a:solidFill>
-                  <a:schemeClr val="tx1"/>
-                </a:solidFill>
-                <a:latin typeface="Calibri" panose="020F0502020204030204" pitchFamily="34" charset="0"/>
-              </a:defRPr>
-            </a:lvl2pPr>
-            <a:lvl3pPr marL="1143000" indent="-228600">
-              <a:defRPr>
-                <a:solidFill>
-                  <a:schemeClr val="tx1"/>
-                </a:solidFill>
-                <a:latin typeface="Calibri" panose="020F0502020204030204" pitchFamily="34" charset="0"/>
-              </a:defRPr>
-            </a:lvl3pPr>
-            <a:lvl4pPr marL="1600200" indent="-228600">
-              <a:defRPr>
-                <a:solidFill>
-                  <a:schemeClr val="tx1"/>
-                </a:solidFill>
-                <a:latin typeface="Calibri" panose="020F0502020204030204" pitchFamily="34" charset="0"/>
-              </a:defRPr>
-            </a:lvl4pPr>
-            <a:lvl5pPr marL="2057400" indent="-228600">
-              <a:defRPr>
-                <a:solidFill>
-                  <a:schemeClr val="tx1"/>
-                </a:solidFill>
-                <a:latin typeface="Calibri" panose="020F0502020204030204" pitchFamily="34" charset="0"/>
-              </a:defRPr>
-            </a:lvl5pPr>
-            <a:lvl6pPr marL="2514600" indent="-228600" eaLnBrk="0" fontAlgn="base" hangingPunct="0">
-              <a:spcBef>
-                <a:spcPct val="0"/>
-              </a:spcBef>
-              <a:spcAft>
-                <a:spcPct val="0"/>
-              </a:spcAft>
-              <a:defRPr>
-                <a:solidFill>
-                  <a:schemeClr val="tx1"/>
-                </a:solidFill>
-                <a:latin typeface="Calibri" panose="020F0502020204030204" pitchFamily="34" charset="0"/>
-              </a:defRPr>
-            </a:lvl6pPr>
-            <a:lvl7pPr marL="2971800" indent="-228600" eaLnBrk="0" fontAlgn="base" hangingPunct="0">
-              <a:spcBef>
-                <a:spcPct val="0"/>
-              </a:spcBef>
-              <a:spcAft>
-                <a:spcPct val="0"/>
-              </a:spcAft>
-              <a:defRPr>
-                <a:solidFill>
-                  <a:schemeClr val="tx1"/>
-                </a:solidFill>
-                <a:latin typeface="Calibri" panose="020F0502020204030204" pitchFamily="34" charset="0"/>
-              </a:defRPr>
-            </a:lvl7pPr>
-            <a:lvl8pPr marL="3429000" indent="-228600" eaLnBrk="0" fontAlgn="base" hangingPunct="0">
-              <a:spcBef>
-                <a:spcPct val="0"/>
-              </a:spcBef>
-              <a:spcAft>
-                <a:spcPct val="0"/>
-              </a:spcAft>
-              <a:defRPr>
-                <a:solidFill>
-                  <a:schemeClr val="tx1"/>
-                </a:solidFill>
-                <a:latin typeface="Calibri" panose="020F0502020204030204" pitchFamily="34" charset="0"/>
-              </a:defRPr>
-            </a:lvl8pPr>
-            <a:lvl9pPr marL="3886200" indent="-228600" eaLnBrk="0" fontAlgn="base" hangingPunct="0">
-              <a:spcBef>
-                <a:spcPct val="0"/>
-              </a:spcBef>
-              <a:spcAft>
-                <a:spcPct val="0"/>
-              </a:spcAft>
-              <a:defRPr>
-                <a:solidFill>
-                  <a:schemeClr val="tx1"/>
-                </a:solidFill>
-                <a:latin typeface="Calibri" panose="020F0502020204030204" pitchFamily="34" charset="0"/>
-              </a:defRPr>
-            </a:lvl9pPr>
-          </a:lstStyle>
-          <a:p>
-            <a:pPr algn="ctr" eaLnBrk="1" hangingPunct="1"/>
-            <a:r>
-              <a:rPr lang="en-US" altLang="en-US" sz="1200" dirty="0">
-                <a:latin typeface="Arial" panose="020B0604020202020204" pitchFamily="34" charset="0"/>
-                <a:ea typeface="Amazon Ember" panose="020B0603020204020204" pitchFamily="34" charset="0"/>
-                <a:cs typeface="Arial" panose="020B0604020202020204" pitchFamily="34" charset="0"/>
-              </a:rPr>
-              <a:t>(Optional) Amazon RDS</a:t>
-            </a:r>
-          </a:p>
-        </p:txBody>
-      </p:sp>
       <p:cxnSp>
         <p:nvCxnSpPr>
           <p:cNvPr id="156" name="Straight Arrow Connector 155">
@@ -9912,15 +9461,15 @@
           </p:cNvPr>
           <p:cNvCxnSpPr>
             <a:cxnSpLocks/>
-            <a:stCxn id="64" idx="3"/>
-            <a:endCxn id="154" idx="1"/>
+            <a:stCxn id="85" idx="3"/>
+            <a:endCxn id="87" idx="1"/>
           </p:cNvCxnSpPr>
           <p:nvPr/>
         </p:nvCxnSpPr>
         <p:spPr>
           <a:xfrm>
-            <a:off x="8963612" y="7252054"/>
-            <a:ext cx="2695437" cy="0"/>
+            <a:off x="8860183" y="7159961"/>
+            <a:ext cx="2921413" cy="0"/>
           </a:xfrm>
           <a:prstGeom prst="straightConnector1">
             <a:avLst/>
@@ -9948,10 +9497,461 @@
           </a:fontRef>
         </p:style>
       </p:cxnSp>
+      <p:sp>
+        <p:nvSpPr>
+          <p:cNvPr id="84" name="TextBox 6">
+            <a:extLst>
+              <a:ext uri="{FF2B5EF4-FFF2-40B4-BE49-F238E27FC236}">
+                <a16:creationId xmlns:a16="http://schemas.microsoft.com/office/drawing/2014/main" id="{1539487A-0884-401B-B0D6-BC08CBC09974}"/>
+              </a:ext>
+            </a:extLst>
+          </p:cNvPr>
+          <p:cNvSpPr txBox="1">
+            <a:spLocks noChangeArrowheads="1"/>
+          </p:cNvSpPr>
+          <p:nvPr/>
+        </p:nvSpPr>
+        <p:spPr bwMode="auto">
+          <a:xfrm>
+            <a:off x="7876290" y="7382582"/>
+            <a:ext cx="1511300" cy="461665"/>
+          </a:xfrm>
+          <a:prstGeom prst="rect">
+            <a:avLst/>
+          </a:prstGeom>
+          <a:noFill/>
+          <a:ln>
+            <a:noFill/>
+          </a:ln>
+          <a:extLst>
+            <a:ext uri="{909E8E84-426E-40DD-AFC4-6F175D3DCCD1}">
+              <a14:hiddenFill xmlns:a14="http://schemas.microsoft.com/office/drawing/2010/main">
+                <a:solidFill>
+                  <a:srgbClr val="FFFFFF"/>
+                </a:solidFill>
+              </a14:hiddenFill>
+            </a:ext>
+            <a:ext uri="{91240B29-F687-4F45-9708-019B960494DF}">
+              <a14:hiddenLine xmlns:a14="http://schemas.microsoft.com/office/drawing/2010/main" w="9525">
+                <a:solidFill>
+                  <a:srgbClr val="000000"/>
+                </a:solidFill>
+                <a:miter lim="800000"/>
+                <a:headEnd/>
+                <a:tailEnd/>
+              </a14:hiddenLine>
+            </a:ext>
+          </a:extLst>
+        </p:spPr>
+        <p:txBody>
+          <a:bodyPr>
+            <a:spAutoFit/>
+          </a:bodyPr>
+          <a:lstStyle>
+            <a:lvl1pPr>
+              <a:defRPr>
+                <a:solidFill>
+                  <a:schemeClr val="tx1"/>
+                </a:solidFill>
+                <a:latin typeface="Calibri" panose="020F0502020204030204" pitchFamily="34" charset="0"/>
+              </a:defRPr>
+            </a:lvl1pPr>
+            <a:lvl2pPr marL="742950" indent="-285750">
+              <a:defRPr>
+                <a:solidFill>
+                  <a:schemeClr val="tx1"/>
+                </a:solidFill>
+                <a:latin typeface="Calibri" panose="020F0502020204030204" pitchFamily="34" charset="0"/>
+              </a:defRPr>
+            </a:lvl2pPr>
+            <a:lvl3pPr marL="1143000" indent="-228600">
+              <a:defRPr>
+                <a:solidFill>
+                  <a:schemeClr val="tx1"/>
+                </a:solidFill>
+                <a:latin typeface="Calibri" panose="020F0502020204030204" pitchFamily="34" charset="0"/>
+              </a:defRPr>
+            </a:lvl3pPr>
+            <a:lvl4pPr marL="1600200" indent="-228600">
+              <a:defRPr>
+                <a:solidFill>
+                  <a:schemeClr val="tx1"/>
+                </a:solidFill>
+                <a:latin typeface="Calibri" panose="020F0502020204030204" pitchFamily="34" charset="0"/>
+              </a:defRPr>
+            </a:lvl4pPr>
+            <a:lvl5pPr marL="2057400" indent="-228600">
+              <a:defRPr>
+                <a:solidFill>
+                  <a:schemeClr val="tx1"/>
+                </a:solidFill>
+                <a:latin typeface="Calibri" panose="020F0502020204030204" pitchFamily="34" charset="0"/>
+              </a:defRPr>
+            </a:lvl5pPr>
+            <a:lvl6pPr marL="2514600" indent="-228600" eaLnBrk="0" fontAlgn="base" hangingPunct="0">
+              <a:spcBef>
+                <a:spcPct val="0"/>
+              </a:spcBef>
+              <a:spcAft>
+                <a:spcPct val="0"/>
+              </a:spcAft>
+              <a:defRPr>
+                <a:solidFill>
+                  <a:schemeClr val="tx1"/>
+                </a:solidFill>
+                <a:latin typeface="Calibri" panose="020F0502020204030204" pitchFamily="34" charset="0"/>
+              </a:defRPr>
+            </a:lvl6pPr>
+            <a:lvl7pPr marL="2971800" indent="-228600" eaLnBrk="0" fontAlgn="base" hangingPunct="0">
+              <a:spcBef>
+                <a:spcPct val="0"/>
+              </a:spcBef>
+              <a:spcAft>
+                <a:spcPct val="0"/>
+              </a:spcAft>
+              <a:defRPr>
+                <a:solidFill>
+                  <a:schemeClr val="tx1"/>
+                </a:solidFill>
+                <a:latin typeface="Calibri" panose="020F0502020204030204" pitchFamily="34" charset="0"/>
+              </a:defRPr>
+            </a:lvl7pPr>
+            <a:lvl8pPr marL="3429000" indent="-228600" eaLnBrk="0" fontAlgn="base" hangingPunct="0">
+              <a:spcBef>
+                <a:spcPct val="0"/>
+              </a:spcBef>
+              <a:spcAft>
+                <a:spcPct val="0"/>
+              </a:spcAft>
+              <a:defRPr>
+                <a:solidFill>
+                  <a:schemeClr val="tx1"/>
+                </a:solidFill>
+                <a:latin typeface="Calibri" panose="020F0502020204030204" pitchFamily="34" charset="0"/>
+              </a:defRPr>
+            </a:lvl8pPr>
+            <a:lvl9pPr marL="3886200" indent="-228600" eaLnBrk="0" fontAlgn="base" hangingPunct="0">
+              <a:spcBef>
+                <a:spcPct val="0"/>
+              </a:spcBef>
+              <a:spcAft>
+                <a:spcPct val="0"/>
+              </a:spcAft>
+              <a:defRPr>
+                <a:solidFill>
+                  <a:schemeClr val="tx1"/>
+                </a:solidFill>
+                <a:latin typeface="Calibri" panose="020F0502020204030204" pitchFamily="34" charset="0"/>
+              </a:defRPr>
+            </a:lvl9pPr>
+          </a:lstStyle>
+          <a:p>
+            <a:pPr algn="ctr" eaLnBrk="1" hangingPunct="1"/>
+            <a:r>
+              <a:rPr lang="en-US" altLang="en-US" sz="1200" dirty="0">
+                <a:latin typeface="Arial" panose="020B0604020202020204" pitchFamily="34" charset="0"/>
+                <a:ea typeface="Amazon Ember" panose="020B0603020204020204" pitchFamily="34" charset="0"/>
+                <a:cs typeface="Arial" panose="020B0604020202020204" pitchFamily="34" charset="0"/>
+              </a:rPr>
+              <a:t>Amazon RDS instance</a:t>
+            </a:r>
+          </a:p>
+        </p:txBody>
+      </p:sp>
+      <p:pic>
+        <p:nvPicPr>
+          <p:cNvPr id="85" name="Graphic 37">
+            <a:extLst>
+              <a:ext uri="{FF2B5EF4-FFF2-40B4-BE49-F238E27FC236}">
+                <a16:creationId xmlns:a16="http://schemas.microsoft.com/office/drawing/2014/main" id="{66AA6FAA-AB57-4591-932E-2B97BF060878}"/>
+              </a:ext>
+            </a:extLst>
+          </p:cNvPr>
+          <p:cNvPicPr>
+            <a:picLocks noChangeAspect="1" noChangeArrowheads="1"/>
+          </p:cNvPicPr>
+          <p:nvPr/>
+        </p:nvPicPr>
+        <p:blipFill>
+          <a:blip r:embed="rId27">
+            <a:extLst>
+              <a:ext uri="{28A0092B-C50C-407E-A947-70E740481C1C}">
+                <a14:useLocalDpi xmlns:a14="http://schemas.microsoft.com/office/drawing/2010/main" val="0"/>
+              </a:ext>
+            </a:extLst>
+          </a:blip>
+          <a:srcRect/>
+          <a:stretch>
+            <a:fillRect/>
+          </a:stretch>
+        </p:blipFill>
+        <p:spPr bwMode="auto">
+          <a:xfrm>
+            <a:off x="8402983" y="6931361"/>
+            <a:ext cx="457200" cy="457200"/>
+          </a:xfrm>
+          <a:prstGeom prst="rect">
+            <a:avLst/>
+          </a:prstGeom>
+          <a:noFill/>
+          <a:ln>
+            <a:noFill/>
+          </a:ln>
+          <a:extLst>
+            <a:ext uri="{909E8E84-426E-40DD-AFC4-6F175D3DCCD1}">
+              <a14:hiddenFill xmlns:a14="http://schemas.microsoft.com/office/drawing/2010/main">
+                <a:solidFill>
+                  <a:srgbClr val="FFFFFF"/>
+                </a:solidFill>
+              </a14:hiddenFill>
+            </a:ext>
+            <a:ext uri="{91240B29-F687-4F45-9708-019B960494DF}">
+              <a14:hiddenLine xmlns:a14="http://schemas.microsoft.com/office/drawing/2010/main" w="9525">
+                <a:solidFill>
+                  <a:srgbClr val="000000"/>
+                </a:solidFill>
+                <a:miter lim="800000"/>
+                <a:headEnd/>
+                <a:tailEnd/>
+              </a14:hiddenLine>
+            </a:ext>
+          </a:extLst>
+        </p:spPr>
+      </p:pic>
+      <p:sp>
+        <p:nvSpPr>
+          <p:cNvPr id="86" name="TextBox 6">
+            <a:extLst>
+              <a:ext uri="{FF2B5EF4-FFF2-40B4-BE49-F238E27FC236}">
+                <a16:creationId xmlns:a16="http://schemas.microsoft.com/office/drawing/2014/main" id="{2CB6291F-D942-44E9-860E-3F38C8D4341E}"/>
+              </a:ext>
+            </a:extLst>
+          </p:cNvPr>
+          <p:cNvSpPr txBox="1">
+            <a:spLocks noChangeArrowheads="1"/>
+          </p:cNvSpPr>
+          <p:nvPr/>
+        </p:nvSpPr>
+        <p:spPr bwMode="auto">
+          <a:xfrm>
+            <a:off x="11254903" y="7382582"/>
+            <a:ext cx="1511300" cy="461665"/>
+          </a:xfrm>
+          <a:prstGeom prst="rect">
+            <a:avLst/>
+          </a:prstGeom>
+          <a:noFill/>
+          <a:ln>
+            <a:noFill/>
+          </a:ln>
+          <a:extLst>
+            <a:ext uri="{909E8E84-426E-40DD-AFC4-6F175D3DCCD1}">
+              <a14:hiddenFill xmlns:a14="http://schemas.microsoft.com/office/drawing/2010/main">
+                <a:solidFill>
+                  <a:srgbClr val="FFFFFF"/>
+                </a:solidFill>
+              </a14:hiddenFill>
+            </a:ext>
+            <a:ext uri="{91240B29-F687-4F45-9708-019B960494DF}">
+              <a14:hiddenLine xmlns:a14="http://schemas.microsoft.com/office/drawing/2010/main" w="9525">
+                <a:solidFill>
+                  <a:srgbClr val="000000"/>
+                </a:solidFill>
+                <a:miter lim="800000"/>
+                <a:headEnd/>
+                <a:tailEnd/>
+              </a14:hiddenLine>
+            </a:ext>
+          </a:extLst>
+        </p:spPr>
+        <p:txBody>
+          <a:bodyPr>
+            <a:spAutoFit/>
+          </a:bodyPr>
+          <a:lstStyle>
+            <a:lvl1pPr>
+              <a:defRPr>
+                <a:solidFill>
+                  <a:schemeClr val="tx1"/>
+                </a:solidFill>
+                <a:latin typeface="Calibri" panose="020F0502020204030204" pitchFamily="34" charset="0"/>
+              </a:defRPr>
+            </a:lvl1pPr>
+            <a:lvl2pPr marL="742950" indent="-285750">
+              <a:defRPr>
+                <a:solidFill>
+                  <a:schemeClr val="tx1"/>
+                </a:solidFill>
+                <a:latin typeface="Calibri" panose="020F0502020204030204" pitchFamily="34" charset="0"/>
+              </a:defRPr>
+            </a:lvl2pPr>
+            <a:lvl3pPr marL="1143000" indent="-228600">
+              <a:defRPr>
+                <a:solidFill>
+                  <a:schemeClr val="tx1"/>
+                </a:solidFill>
+                <a:latin typeface="Calibri" panose="020F0502020204030204" pitchFamily="34" charset="0"/>
+              </a:defRPr>
+            </a:lvl3pPr>
+            <a:lvl4pPr marL="1600200" indent="-228600">
+              <a:defRPr>
+                <a:solidFill>
+                  <a:schemeClr val="tx1"/>
+                </a:solidFill>
+                <a:latin typeface="Calibri" panose="020F0502020204030204" pitchFamily="34" charset="0"/>
+              </a:defRPr>
+            </a:lvl4pPr>
+            <a:lvl5pPr marL="2057400" indent="-228600">
+              <a:defRPr>
+                <a:solidFill>
+                  <a:schemeClr val="tx1"/>
+                </a:solidFill>
+                <a:latin typeface="Calibri" panose="020F0502020204030204" pitchFamily="34" charset="0"/>
+              </a:defRPr>
+            </a:lvl5pPr>
+            <a:lvl6pPr marL="2514600" indent="-228600" eaLnBrk="0" fontAlgn="base" hangingPunct="0">
+              <a:spcBef>
+                <a:spcPct val="0"/>
+              </a:spcBef>
+              <a:spcAft>
+                <a:spcPct val="0"/>
+              </a:spcAft>
+              <a:defRPr>
+                <a:solidFill>
+                  <a:schemeClr val="tx1"/>
+                </a:solidFill>
+                <a:latin typeface="Calibri" panose="020F0502020204030204" pitchFamily="34" charset="0"/>
+              </a:defRPr>
+            </a:lvl6pPr>
+            <a:lvl7pPr marL="2971800" indent="-228600" eaLnBrk="0" fontAlgn="base" hangingPunct="0">
+              <a:spcBef>
+                <a:spcPct val="0"/>
+              </a:spcBef>
+              <a:spcAft>
+                <a:spcPct val="0"/>
+              </a:spcAft>
+              <a:defRPr>
+                <a:solidFill>
+                  <a:schemeClr val="tx1"/>
+                </a:solidFill>
+                <a:latin typeface="Calibri" panose="020F0502020204030204" pitchFamily="34" charset="0"/>
+              </a:defRPr>
+            </a:lvl7pPr>
+            <a:lvl8pPr marL="3429000" indent="-228600" eaLnBrk="0" fontAlgn="base" hangingPunct="0">
+              <a:spcBef>
+                <a:spcPct val="0"/>
+              </a:spcBef>
+              <a:spcAft>
+                <a:spcPct val="0"/>
+              </a:spcAft>
+              <a:defRPr>
+                <a:solidFill>
+                  <a:schemeClr val="tx1"/>
+                </a:solidFill>
+                <a:latin typeface="Calibri" panose="020F0502020204030204" pitchFamily="34" charset="0"/>
+              </a:defRPr>
+            </a:lvl8pPr>
+            <a:lvl9pPr marL="3886200" indent="-228600" eaLnBrk="0" fontAlgn="base" hangingPunct="0">
+              <a:spcBef>
+                <a:spcPct val="0"/>
+              </a:spcBef>
+              <a:spcAft>
+                <a:spcPct val="0"/>
+              </a:spcAft>
+              <a:defRPr>
+                <a:solidFill>
+                  <a:schemeClr val="tx1"/>
+                </a:solidFill>
+                <a:latin typeface="Calibri" panose="020F0502020204030204" pitchFamily="34" charset="0"/>
+              </a:defRPr>
+            </a:lvl9pPr>
+          </a:lstStyle>
+          <a:p>
+            <a:pPr algn="ctr" eaLnBrk="1" hangingPunct="1"/>
+            <a:r>
+              <a:rPr lang="en-US" altLang="en-US" sz="1200" dirty="0">
+                <a:latin typeface="Arial" panose="020B0604020202020204" pitchFamily="34" charset="0"/>
+                <a:ea typeface="Amazon Ember" panose="020B0603020204020204" pitchFamily="34" charset="0"/>
+                <a:cs typeface="Arial" panose="020B0604020202020204" pitchFamily="34" charset="0"/>
+              </a:rPr>
+              <a:t>(Optional) Amazon RDS instance</a:t>
+            </a:r>
+          </a:p>
+        </p:txBody>
+      </p:sp>
+      <p:pic>
+        <p:nvPicPr>
+          <p:cNvPr id="87" name="Graphic 37">
+            <a:extLst>
+              <a:ext uri="{FF2B5EF4-FFF2-40B4-BE49-F238E27FC236}">
+                <a16:creationId xmlns:a16="http://schemas.microsoft.com/office/drawing/2014/main" id="{59EB8C66-4D4B-4642-B9A1-6AA04291C913}"/>
+              </a:ext>
+            </a:extLst>
+          </p:cNvPr>
+          <p:cNvPicPr>
+            <a:picLocks noChangeAspect="1" noChangeArrowheads="1"/>
+          </p:cNvPicPr>
+          <p:nvPr/>
+        </p:nvPicPr>
+        <p:blipFill>
+          <a:blip r:embed="rId28">
+            <a:extLst>
+              <a:ext uri="{BEBA8EAE-BF5A-486C-A8C5-ECC9F3942E4B}">
+                <a14:imgProps xmlns:a14="http://schemas.microsoft.com/office/drawing/2010/main">
+                  <a14:imgLayer r:embed="rId29">
+                    <a14:imgEffect>
+                      <a14:artisticBlur/>
+                    </a14:imgEffect>
+                  </a14:imgLayer>
+                </a14:imgProps>
+              </a:ext>
+              <a:ext uri="{28A0092B-C50C-407E-A947-70E740481C1C}">
+                <a14:useLocalDpi xmlns:a14="http://schemas.microsoft.com/office/drawing/2010/main" val="0"/>
+              </a:ext>
+            </a:extLst>
+          </a:blip>
+          <a:srcRect/>
+          <a:stretch>
+            <a:fillRect/>
+          </a:stretch>
+        </p:blipFill>
+        <p:spPr bwMode="auto">
+          <a:xfrm>
+            <a:off x="11781596" y="6931361"/>
+            <a:ext cx="457200" cy="457200"/>
+          </a:xfrm>
+          <a:prstGeom prst="rect">
+            <a:avLst/>
+          </a:prstGeom>
+          <a:noFill/>
+          <a:ln>
+            <a:noFill/>
+          </a:ln>
+          <a:extLst>
+            <a:ext uri="{909E8E84-426E-40DD-AFC4-6F175D3DCCD1}">
+              <a14:hiddenFill xmlns:a14="http://schemas.microsoft.com/office/drawing/2010/main">
+                <a:solidFill>
+                  <a:srgbClr val="FFFFFF"/>
+                </a:solidFill>
+              </a14:hiddenFill>
+            </a:ext>
+            <a:ext uri="{91240B29-F687-4F45-9708-019B960494DF}">
+              <a14:hiddenLine xmlns:a14="http://schemas.microsoft.com/office/drawing/2010/main" w="9525">
+                <a:solidFill>
+                  <a:srgbClr val="000000"/>
+                </a:solidFill>
+                <a:miter lim="800000"/>
+                <a:headEnd/>
+                <a:tailEnd/>
+              </a14:hiddenLine>
+            </a:ext>
+          </a:extLst>
+        </p:spPr>
+      </p:pic>
     </p:spTree>
     <p:extLst>
       <p:ext uri="{BB962C8B-B14F-4D97-AF65-F5344CB8AC3E}">
-        <p14:creationId xmlns:p14="http://schemas.microsoft.com/office/powerpoint/2010/main" val="2879453960"/>
+        <p14:creationId xmlns:p14="http://schemas.microsoft.com/office/powerpoint/2010/main" val="2291138731"/>
       </p:ext>
     </p:extLst>
   </p:cSld>

</xml_diff>